<commit_message>
Update Intro presentation with distinction between Continuous Delivery and Continuous Deployment
</commit_message>
<xml_diff>
--- a/Lectures/DevOps Course - 01 - Intro.pptx
+++ b/Lectures/DevOps Course - 01 - Intro.pptx
@@ -10252,7 +10252,7 @@
           </a:ln>
           <a:extLst>
             <a:ext uri="{C572A759-6A51-4108-AA02-DFA0A04FC94B}">
-              <ma14:wrappingTextBoxFlag xmlns:ma14="http://schemas.microsoft.com/office/mac/drawingml/2011/main" xmlns:a14="http://schemas.microsoft.com/office/drawing/2010/main" xmlns:m="http://schemas.openxmlformats.org/officeDocument/2006/math" xmlns="" val="1"/>
+              <ma14:wrappingTextBoxFlag xmlns="" xmlns:m="http://schemas.openxmlformats.org/officeDocument/2006/math" xmlns:a14="http://schemas.microsoft.com/office/drawing/2010/main" xmlns:ma14="http://schemas.microsoft.com/office/mac/drawingml/2011/main" val="1"/>
             </a:ext>
           </a:extLst>
         </p:spPr>
@@ -10291,7 +10291,7 @@
           </a:ln>
           <a:extLst>
             <a:ext uri="{C572A759-6A51-4108-AA02-DFA0A04FC94B}">
-              <ma14:wrappingTextBoxFlag xmlns:ma14="http://schemas.microsoft.com/office/mac/drawingml/2011/main" xmlns:a14="http://schemas.microsoft.com/office/drawing/2010/main" xmlns:m="http://schemas.openxmlformats.org/officeDocument/2006/math" xmlns="" val="1"/>
+              <ma14:wrappingTextBoxFlag xmlns="" xmlns:m="http://schemas.openxmlformats.org/officeDocument/2006/math" xmlns:a14="http://schemas.microsoft.com/office/drawing/2010/main" xmlns:ma14="http://schemas.microsoft.com/office/mac/drawingml/2011/main" val="1"/>
             </a:ext>
           </a:extLst>
         </p:spPr>
@@ -11172,7 +11172,7 @@
           </a:prstGeom>
           <a:extLst>
             <a:ext uri="{C572A759-6A51-4108-AA02-DFA0A04FC94B}">
-              <ma14:wrappingTextBoxFlag xmlns:ma14="http://schemas.microsoft.com/office/mac/drawingml/2011/main" xmlns:a14="http://schemas.microsoft.com/office/drawing/2010/main" xmlns:m="http://schemas.openxmlformats.org/officeDocument/2006/math" xmlns="" val="1"/>
+              <ma14:wrappingTextBoxFlag xmlns="" xmlns:m="http://schemas.openxmlformats.org/officeDocument/2006/math" xmlns:a14="http://schemas.microsoft.com/office/drawing/2010/main" xmlns:ma14="http://schemas.microsoft.com/office/mac/drawingml/2011/main" val="1"/>
             </a:ext>
           </a:extLst>
         </p:spPr>
@@ -13686,7 +13686,7 @@
         </p:spPr>
         <p:txBody>
           <a:bodyPr>
-            <a:normAutofit fontScale="92500" lnSpcReduction="10000"/>
+            <a:normAutofit fontScale="70000" lnSpcReduction="20000"/>
           </a:bodyPr>
           <a:lstStyle/>
           <a:p>
@@ -13753,8 +13753,9 @@
           <a:p>
             <a:r>
               <a:rPr lang="en-BG" dirty="0"/>
-              <a:t>Continuous Delivery / Deployment (CD)</a:t>
-            </a:r>
+              <a:t>Continuous Delivery</a:t>
+            </a:r>
+            <a:endParaRPr lang="bg-BG" dirty="0"/>
           </a:p>
           <a:p>
             <a:pPr lvl="1"/>
@@ -13796,6 +13797,59 @@
               <a:rPr lang="bg-BG" dirty="0"/>
               <a:t>, за да отнема по-малко време</a:t>
             </a:r>
+          </a:p>
+          <a:p>
+            <a:pPr lvl="1"/>
+            <a:r>
+              <a:rPr lang="bg-BG" dirty="0"/>
+              <a:t>Може да има ръчна стъпка по одобрение на </a:t>
+            </a:r>
+            <a:r>
+              <a:rPr lang="en-GB" dirty="0"/>
+              <a:t>delivery to production</a:t>
+            </a:r>
+          </a:p>
+          <a:p>
+            <a:r>
+              <a:rPr lang="en-GB" dirty="0"/>
+              <a:t>Continuous Deployment</a:t>
+            </a:r>
+          </a:p>
+          <a:p>
+            <a:pPr lvl="1"/>
+            <a:r>
+              <a:rPr lang="bg-BG" dirty="0"/>
+              <a:t>Частен случай на </a:t>
+            </a:r>
+            <a:r>
+              <a:rPr lang="en-GB" dirty="0"/>
+              <a:t>Continuous Delivery</a:t>
+            </a:r>
+            <a:r>
+              <a:rPr lang="bg-BG" dirty="0"/>
+              <a:t>, при който всяка одобрена промяна в </a:t>
+            </a:r>
+            <a:r>
+              <a:rPr lang="en-GB" dirty="0"/>
+              <a:t>source code</a:t>
+            </a:r>
+            <a:r>
+              <a:rPr lang="bg-BG" dirty="0"/>
+              <a:t> изминава автоматично целия път до </a:t>
+            </a:r>
+            <a:r>
+              <a:rPr lang="en-GB" dirty="0"/>
+              <a:t>production, </a:t>
+            </a:r>
+            <a:r>
+              <a:rPr lang="bg-BG" dirty="0"/>
+              <a:t>без </a:t>
+            </a:r>
+            <a:r>
+              <a:rPr lang="bg-BG"/>
+              <a:t>ръчни стъпки</a:t>
+            </a:r>
+            <a:endParaRPr lang="bg-BG" dirty="0"/>
           </a:p>
         </p:txBody>
       </p:sp>

</xml_diff>